<commit_message>
pptx file -final changes
</commit_message>
<xml_diff>
--- a/Slides/RR_project_slides.pptx
+++ b/Slides/RR_project_slides.pptx
@@ -141,10 +141,33 @@
   <pc:docChgLst>
     <pc:chgData name="Tarlan Aghayev" userId="da6ce445de4c2ee1" providerId="LiveId" clId="{5799D50A-D4BB-40C1-8A0D-C9E3F87D0362}"/>
     <pc:docChg chg="undo custSel addSld delSld modSld sldOrd">
-      <pc:chgData name="Tarlan Aghayev" userId="da6ce445de4c2ee1" providerId="LiveId" clId="{5799D50A-D4BB-40C1-8A0D-C9E3F87D0362}" dt="2024-06-11T20:43:16.909" v="867" actId="12"/>
+      <pc:chgData name="Tarlan Aghayev" userId="da6ce445de4c2ee1" providerId="LiveId" clId="{5799D50A-D4BB-40C1-8A0D-C9E3F87D0362}" dt="2024-06-12T06:18:42.757" v="982" actId="27636"/>
       <pc:docMkLst>
         <pc:docMk/>
       </pc:docMkLst>
+      <pc:sldChg chg="modSp mod">
+        <pc:chgData name="Tarlan Aghayev" userId="da6ce445de4c2ee1" providerId="LiveId" clId="{5799D50A-D4BB-40C1-8A0D-C9E3F87D0362}" dt="2024-06-12T06:18:42.757" v="982" actId="27636"/>
+        <pc:sldMkLst>
+          <pc:docMk/>
+          <pc:sldMk cId="3919622244" sldId="257"/>
+        </pc:sldMkLst>
+        <pc:spChg chg="mod">
+          <ac:chgData name="Tarlan Aghayev" userId="da6ce445de4c2ee1" providerId="LiveId" clId="{5799D50A-D4BB-40C1-8A0D-C9E3F87D0362}" dt="2024-06-12T06:18:40.039" v="980" actId="14100"/>
+          <ac:spMkLst>
+            <pc:docMk/>
+            <pc:sldMk cId="3919622244" sldId="257"/>
+            <ac:spMk id="2" creationId="{32C432B7-0A6C-2C12-77FA-7B714600B30E}"/>
+          </ac:spMkLst>
+        </pc:spChg>
+        <pc:spChg chg="mod">
+          <ac:chgData name="Tarlan Aghayev" userId="da6ce445de4c2ee1" providerId="LiveId" clId="{5799D50A-D4BB-40C1-8A0D-C9E3F87D0362}" dt="2024-06-12T06:18:42.757" v="982" actId="27636"/>
+          <ac:spMkLst>
+            <pc:docMk/>
+            <pc:sldMk cId="3919622244" sldId="257"/>
+            <ac:spMk id="7" creationId="{6E2D6785-3FC0-5B4B-8F43-4406AD91B4D7}"/>
+          </ac:spMkLst>
+        </pc:spChg>
+      </pc:sldChg>
       <pc:sldChg chg="modSp mod ord">
         <pc:chgData name="Tarlan Aghayev" userId="da6ce445de4c2ee1" providerId="LiveId" clId="{5799D50A-D4BB-40C1-8A0D-C9E3F87D0362}" dt="2024-06-11T20:43:16.909" v="867" actId="12"/>
         <pc:sldMkLst>
@@ -199,13 +222,13 @@
         </pc:spChg>
       </pc:sldChg>
       <pc:sldChg chg="modSp mod">
-        <pc:chgData name="Tarlan Aghayev" userId="da6ce445de4c2ee1" providerId="LiveId" clId="{5799D50A-D4BB-40C1-8A0D-C9E3F87D0362}" dt="2024-06-11T20:42:52.944" v="865" actId="20577"/>
+        <pc:chgData name="Tarlan Aghayev" userId="da6ce445de4c2ee1" providerId="LiveId" clId="{5799D50A-D4BB-40C1-8A0D-C9E3F87D0362}" dt="2024-06-12T05:14:42.811" v="874" actId="20577"/>
         <pc:sldMkLst>
           <pc:docMk/>
           <pc:sldMk cId="2456523026" sldId="266"/>
         </pc:sldMkLst>
         <pc:spChg chg="mod">
-          <ac:chgData name="Tarlan Aghayev" userId="da6ce445de4c2ee1" providerId="LiveId" clId="{5799D50A-D4BB-40C1-8A0D-C9E3F87D0362}" dt="2024-06-11T20:42:52.944" v="865" actId="20577"/>
+          <ac:chgData name="Tarlan Aghayev" userId="da6ce445de4c2ee1" providerId="LiveId" clId="{5799D50A-D4BB-40C1-8A0D-C9E3F87D0362}" dt="2024-06-12T05:14:42.811" v="874" actId="20577"/>
           <ac:spMkLst>
             <pc:docMk/>
             <pc:sldMk cId="2456523026" sldId="266"/>
@@ -1179,7 +1202,7 @@
           <a:p>
             <a:fld id="{8FE51000-7EF1-AF44-AAD8-9F8A57785F9C}" type="datetimeFigureOut">
               <a:rPr lang="en-PL" smtClean="0"/>
-              <a:t>06/11/2024</a:t>
+              <a:t>06/12/2024</a:t>
             </a:fld>
             <a:endParaRPr lang="en-PL"/>
           </a:p>
@@ -1379,7 +1402,7 @@
           <a:p>
             <a:fld id="{8FE51000-7EF1-AF44-AAD8-9F8A57785F9C}" type="datetimeFigureOut">
               <a:rPr lang="en-PL" smtClean="0"/>
-              <a:t>06/11/2024</a:t>
+              <a:t>06/12/2024</a:t>
             </a:fld>
             <a:endParaRPr lang="en-PL"/>
           </a:p>
@@ -1589,7 +1612,7 @@
           <a:p>
             <a:fld id="{8FE51000-7EF1-AF44-AAD8-9F8A57785F9C}" type="datetimeFigureOut">
               <a:rPr lang="en-PL" smtClean="0"/>
-              <a:t>06/11/2024</a:t>
+              <a:t>06/12/2024</a:t>
             </a:fld>
             <a:endParaRPr lang="en-PL"/>
           </a:p>
@@ -1789,7 +1812,7 @@
           <a:p>
             <a:fld id="{8FE51000-7EF1-AF44-AAD8-9F8A57785F9C}" type="datetimeFigureOut">
               <a:rPr lang="en-PL" smtClean="0"/>
-              <a:t>06/11/2024</a:t>
+              <a:t>06/12/2024</a:t>
             </a:fld>
             <a:endParaRPr lang="en-PL"/>
           </a:p>
@@ -2065,7 +2088,7 @@
           <a:p>
             <a:fld id="{8FE51000-7EF1-AF44-AAD8-9F8A57785F9C}" type="datetimeFigureOut">
               <a:rPr lang="en-PL" smtClean="0"/>
-              <a:t>06/11/2024</a:t>
+              <a:t>06/12/2024</a:t>
             </a:fld>
             <a:endParaRPr lang="en-PL"/>
           </a:p>
@@ -2333,7 +2356,7 @@
           <a:p>
             <a:fld id="{8FE51000-7EF1-AF44-AAD8-9F8A57785F9C}" type="datetimeFigureOut">
               <a:rPr lang="en-PL" smtClean="0"/>
-              <a:t>06/11/2024</a:t>
+              <a:t>06/12/2024</a:t>
             </a:fld>
             <a:endParaRPr lang="en-PL"/>
           </a:p>
@@ -2748,7 +2771,7 @@
           <a:p>
             <a:fld id="{8FE51000-7EF1-AF44-AAD8-9F8A57785F9C}" type="datetimeFigureOut">
               <a:rPr lang="en-PL" smtClean="0"/>
-              <a:t>06/11/2024</a:t>
+              <a:t>06/12/2024</a:t>
             </a:fld>
             <a:endParaRPr lang="en-PL"/>
           </a:p>
@@ -2890,7 +2913,7 @@
           <a:p>
             <a:fld id="{8FE51000-7EF1-AF44-AAD8-9F8A57785F9C}" type="datetimeFigureOut">
               <a:rPr lang="en-PL" smtClean="0"/>
-              <a:t>06/11/2024</a:t>
+              <a:t>06/12/2024</a:t>
             </a:fld>
             <a:endParaRPr lang="en-PL"/>
           </a:p>
@@ -3003,7 +3026,7 @@
           <a:p>
             <a:fld id="{8FE51000-7EF1-AF44-AAD8-9F8A57785F9C}" type="datetimeFigureOut">
               <a:rPr lang="en-PL" smtClean="0"/>
-              <a:t>06/11/2024</a:t>
+              <a:t>06/12/2024</a:t>
             </a:fld>
             <a:endParaRPr lang="en-PL"/>
           </a:p>
@@ -3316,7 +3339,7 @@
           <a:p>
             <a:fld id="{8FE51000-7EF1-AF44-AAD8-9F8A57785F9C}" type="datetimeFigureOut">
               <a:rPr lang="en-PL" smtClean="0"/>
-              <a:t>06/11/2024</a:t>
+              <a:t>06/12/2024</a:t>
             </a:fld>
             <a:endParaRPr lang="en-PL"/>
           </a:p>
@@ -3605,7 +3628,7 @@
           <a:p>
             <a:fld id="{8FE51000-7EF1-AF44-AAD8-9F8A57785F9C}" type="datetimeFigureOut">
               <a:rPr lang="en-PL" smtClean="0"/>
-              <a:t>06/11/2024</a:t>
+              <a:t>06/12/2024</a:t>
             </a:fld>
             <a:endParaRPr lang="en-PL"/>
           </a:p>
@@ -3848,7 +3871,7 @@
           <a:p>
             <a:fld id="{8FE51000-7EF1-AF44-AAD8-9F8A57785F9C}" type="datetimeFigureOut">
               <a:rPr lang="en-PL" smtClean="0"/>
-              <a:t>06/11/2024</a:t>
+              <a:t>06/12/2024</a:t>
             </a:fld>
             <a:endParaRPr lang="en-PL"/>
           </a:p>
@@ -8895,7 +8918,7 @@
                 <a:latin typeface="Arial" panose="020B0604020202020204" pitchFamily="34" charset="0"/>
                 <a:cs typeface="Arial" panose="020B0604020202020204" pitchFamily="34" charset="0"/>
               </a:rPr>
-              <a:t>We used use following AI tools while building our project:</a:t>
+              <a:t>We used following AI tools while building our project:</a:t>
             </a:r>
           </a:p>
           <a:p>
@@ -11100,7 +11123,7 @@
         <p:spPr>
           <a:xfrm>
             <a:off x="1136397" y="502020"/>
-            <a:ext cx="5323715" cy="1642970"/>
+            <a:ext cx="5323715" cy="1076057"/>
           </a:xfrm>
         </p:spPr>
         <p:txBody>
@@ -11138,8 +11161,8 @@
         </p:nvSpPr>
         <p:spPr>
           <a:xfrm>
-            <a:off x="1144923" y="2405894"/>
-            <a:ext cx="5315189" cy="3535083"/>
+            <a:off x="1144923" y="2080097"/>
+            <a:ext cx="5315189" cy="4275883"/>
           </a:xfrm>
           <a:prstGeom prst="rect">
             <a:avLst/>
@@ -11147,7 +11170,7 @@
         </p:spPr>
         <p:txBody>
           <a:bodyPr vert="horz" lIns="91440" tIns="45720" rIns="91440" bIns="45720" rtlCol="0" anchor="t">
-            <a:normAutofit fontScale="92500" lnSpcReduction="10000"/>
+            <a:normAutofit fontScale="92500" lnSpcReduction="20000"/>
           </a:bodyPr>
           <a:lstStyle>
             <a:lvl1pPr marL="228600" indent="-228600" algn="l" defTabSz="914400" rtl="0" eaLnBrk="1" latinLnBrk="0" hangingPunct="1">
@@ -11365,7 +11388,17 @@
                 <a:latin typeface="Arial" panose="020B0604020202020204" pitchFamily="34" charset="0"/>
                 <a:cs typeface="Arial" panose="020B0604020202020204" pitchFamily="34" charset="0"/>
               </a:rPr>
-              <a:t>Dataset was taken from UCI website and represented only selected number of observations – around 5k out of 45k.</a:t>
+              <a:t>Dataset was taken from UCI website and represented only selected number of observations – around 11k out of 45k.</a:t>
+            </a:r>
+          </a:p>
+          <a:p>
+            <a:pPr marL="0"/>
+            <a:r>
+              <a:rPr lang="en-US" dirty="0">
+                <a:latin typeface="Arial" panose="020B0604020202020204" pitchFamily="34" charset="0"/>
+                <a:cs typeface="Arial" panose="020B0604020202020204" pitchFamily="34" charset="0"/>
+              </a:rPr>
+              <a:t> The core aim is to predict if the customer will subscribe or not</a:t>
             </a:r>
           </a:p>
         </p:txBody>

</xml_diff>